<commit_message>
adding formation comparison plots
</commit_message>
<xml_diff>
--- a/Astro_Origin_table_horiz.pptx
+++ b/Astro_Origin_table_horiz.pptx
@@ -197,7 +197,7 @@
           <a:p>
             <a:fld id="{56190867-FD12-ED4C-AD02-12B91CD72869}" type="datetimeFigureOut">
               <a:rPr lang="en-US" smtClean="0"/>
-              <a:t>5/12/25</a:t>
+              <a:t>5/23/25</a:t>
             </a:fld>
             <a:endParaRPr lang="en-US"/>
           </a:p>
@@ -1038,7 +1038,7 @@
           <a:p>
             <a:fld id="{42B10BCD-A866-B34B-B7E8-44C4BB9D2819}" type="datetimeFigureOut">
               <a:rPr lang="en-US" smtClean="0"/>
-              <a:t>5/12/25</a:t>
+              <a:t>5/23/25</a:t>
             </a:fld>
             <a:endParaRPr lang="en-US"/>
           </a:p>
@@ -1208,7 +1208,7 @@
           <a:p>
             <a:fld id="{42B10BCD-A866-B34B-B7E8-44C4BB9D2819}" type="datetimeFigureOut">
               <a:rPr lang="en-US" smtClean="0"/>
-              <a:t>5/12/25</a:t>
+              <a:t>5/23/25</a:t>
             </a:fld>
             <a:endParaRPr lang="en-US"/>
           </a:p>
@@ -1388,7 +1388,7 @@
           <a:p>
             <a:fld id="{42B10BCD-A866-B34B-B7E8-44C4BB9D2819}" type="datetimeFigureOut">
               <a:rPr lang="en-US" smtClean="0"/>
-              <a:t>5/12/25</a:t>
+              <a:t>5/23/25</a:t>
             </a:fld>
             <a:endParaRPr lang="en-US"/>
           </a:p>
@@ -1619,7 +1619,7 @@
           <a:p>
             <a:fld id="{42B10BCD-A866-B34B-B7E8-44C4BB9D2819}" type="datetimeFigureOut">
               <a:rPr lang="en-US" smtClean="0"/>
-              <a:t>5/12/25</a:t>
+              <a:t>5/23/25</a:t>
             </a:fld>
             <a:endParaRPr lang="en-US"/>
           </a:p>
@@ -1865,7 +1865,7 @@
           <a:p>
             <a:fld id="{42B10BCD-A866-B34B-B7E8-44C4BB9D2819}" type="datetimeFigureOut">
               <a:rPr lang="en-US" smtClean="0"/>
-              <a:t>5/12/25</a:t>
+              <a:t>5/23/25</a:t>
             </a:fld>
             <a:endParaRPr lang="en-US"/>
           </a:p>
@@ -2097,7 +2097,7 @@
           <a:p>
             <a:fld id="{42B10BCD-A866-B34B-B7E8-44C4BB9D2819}" type="datetimeFigureOut">
               <a:rPr lang="en-US" smtClean="0"/>
-              <a:t>5/12/25</a:t>
+              <a:t>5/23/25</a:t>
             </a:fld>
             <a:endParaRPr lang="en-US"/>
           </a:p>
@@ -2464,7 +2464,7 @@
           <a:p>
             <a:fld id="{42B10BCD-A866-B34B-B7E8-44C4BB9D2819}" type="datetimeFigureOut">
               <a:rPr lang="en-US" smtClean="0"/>
-              <a:t>5/12/25</a:t>
+              <a:t>5/23/25</a:t>
             </a:fld>
             <a:endParaRPr lang="en-US"/>
           </a:p>
@@ -2582,7 +2582,7 @@
           <a:p>
             <a:fld id="{42B10BCD-A866-B34B-B7E8-44C4BB9D2819}" type="datetimeFigureOut">
               <a:rPr lang="en-US" smtClean="0"/>
-              <a:t>5/12/25</a:t>
+              <a:t>5/23/25</a:t>
             </a:fld>
             <a:endParaRPr lang="en-US"/>
           </a:p>
@@ -2677,7 +2677,7 @@
           <a:p>
             <a:fld id="{42B10BCD-A866-B34B-B7E8-44C4BB9D2819}" type="datetimeFigureOut">
               <a:rPr lang="en-US" smtClean="0"/>
-              <a:t>5/12/25</a:t>
+              <a:t>5/23/25</a:t>
             </a:fld>
             <a:endParaRPr lang="en-US"/>
           </a:p>
@@ -2954,7 +2954,7 @@
           <a:p>
             <a:fld id="{42B10BCD-A866-B34B-B7E8-44C4BB9D2819}" type="datetimeFigureOut">
               <a:rPr lang="en-US" smtClean="0"/>
-              <a:t>5/12/25</a:t>
+              <a:t>5/23/25</a:t>
             </a:fld>
             <a:endParaRPr lang="en-US"/>
           </a:p>
@@ -3211,7 +3211,7 @@
           <a:p>
             <a:fld id="{42B10BCD-A866-B34B-B7E8-44C4BB9D2819}" type="datetimeFigureOut">
               <a:rPr lang="en-US" smtClean="0"/>
-              <a:t>5/12/25</a:t>
+              <a:t>5/23/25</a:t>
             </a:fld>
             <a:endParaRPr lang="en-US"/>
           </a:p>
@@ -3424,7 +3424,7 @@
           <a:p>
             <a:fld id="{42B10BCD-A866-B34B-B7E8-44C4BB9D2819}" type="datetimeFigureOut">
               <a:rPr lang="en-US" smtClean="0"/>
-              <a:t>5/12/25</a:t>
+              <a:t>5/23/25</a:t>
             </a:fld>
             <a:endParaRPr lang="en-US"/>
           </a:p>

</xml_diff>

<commit_message>
making variations of the formation compare plot for presentation
</commit_message>
<xml_diff>
--- a/Astro_Origin_table_horiz.pptx
+++ b/Astro_Origin_table_horiz.pptx
@@ -197,7 +197,7 @@
           <a:p>
             <a:fld id="{56190867-FD12-ED4C-AD02-12B91CD72869}" type="datetimeFigureOut">
               <a:rPr lang="en-US" smtClean="0"/>
-              <a:t>6/2/25</a:t>
+              <a:t>6/5/25</a:t>
             </a:fld>
             <a:endParaRPr lang="en-US"/>
           </a:p>
@@ -1038,7 +1038,7 @@
           <a:p>
             <a:fld id="{42B10BCD-A866-B34B-B7E8-44C4BB9D2819}" type="datetimeFigureOut">
               <a:rPr lang="en-US" smtClean="0"/>
-              <a:t>6/2/25</a:t>
+              <a:t>6/5/25</a:t>
             </a:fld>
             <a:endParaRPr lang="en-US"/>
           </a:p>
@@ -1208,7 +1208,7 @@
           <a:p>
             <a:fld id="{42B10BCD-A866-B34B-B7E8-44C4BB9D2819}" type="datetimeFigureOut">
               <a:rPr lang="en-US" smtClean="0"/>
-              <a:t>6/2/25</a:t>
+              <a:t>6/5/25</a:t>
             </a:fld>
             <a:endParaRPr lang="en-US"/>
           </a:p>
@@ -1388,7 +1388,7 @@
           <a:p>
             <a:fld id="{42B10BCD-A866-B34B-B7E8-44C4BB9D2819}" type="datetimeFigureOut">
               <a:rPr lang="en-US" smtClean="0"/>
-              <a:t>6/2/25</a:t>
+              <a:t>6/5/25</a:t>
             </a:fld>
             <a:endParaRPr lang="en-US"/>
           </a:p>
@@ -1619,7 +1619,7 @@
           <a:p>
             <a:fld id="{42B10BCD-A866-B34B-B7E8-44C4BB9D2819}" type="datetimeFigureOut">
               <a:rPr lang="en-US" smtClean="0"/>
-              <a:t>6/2/25</a:t>
+              <a:t>6/5/25</a:t>
             </a:fld>
             <a:endParaRPr lang="en-US"/>
           </a:p>
@@ -1865,7 +1865,7 @@
           <a:p>
             <a:fld id="{42B10BCD-A866-B34B-B7E8-44C4BB9D2819}" type="datetimeFigureOut">
               <a:rPr lang="en-US" smtClean="0"/>
-              <a:t>6/2/25</a:t>
+              <a:t>6/5/25</a:t>
             </a:fld>
             <a:endParaRPr lang="en-US"/>
           </a:p>
@@ -2097,7 +2097,7 @@
           <a:p>
             <a:fld id="{42B10BCD-A866-B34B-B7E8-44C4BB9D2819}" type="datetimeFigureOut">
               <a:rPr lang="en-US" smtClean="0"/>
-              <a:t>6/2/25</a:t>
+              <a:t>6/5/25</a:t>
             </a:fld>
             <a:endParaRPr lang="en-US"/>
           </a:p>
@@ -2464,7 +2464,7 @@
           <a:p>
             <a:fld id="{42B10BCD-A866-B34B-B7E8-44C4BB9D2819}" type="datetimeFigureOut">
               <a:rPr lang="en-US" smtClean="0"/>
-              <a:t>6/2/25</a:t>
+              <a:t>6/5/25</a:t>
             </a:fld>
             <a:endParaRPr lang="en-US"/>
           </a:p>
@@ -2582,7 +2582,7 @@
           <a:p>
             <a:fld id="{42B10BCD-A866-B34B-B7E8-44C4BB9D2819}" type="datetimeFigureOut">
               <a:rPr lang="en-US" smtClean="0"/>
-              <a:t>6/2/25</a:t>
+              <a:t>6/5/25</a:t>
             </a:fld>
             <a:endParaRPr lang="en-US"/>
           </a:p>
@@ -2677,7 +2677,7 @@
           <a:p>
             <a:fld id="{42B10BCD-A866-B34B-B7E8-44C4BB9D2819}" type="datetimeFigureOut">
               <a:rPr lang="en-US" smtClean="0"/>
-              <a:t>6/2/25</a:t>
+              <a:t>6/5/25</a:t>
             </a:fld>
             <a:endParaRPr lang="en-US"/>
           </a:p>
@@ -2954,7 +2954,7 @@
           <a:p>
             <a:fld id="{42B10BCD-A866-B34B-B7E8-44C4BB9D2819}" type="datetimeFigureOut">
               <a:rPr lang="en-US" smtClean="0"/>
-              <a:t>6/2/25</a:t>
+              <a:t>6/5/25</a:t>
             </a:fld>
             <a:endParaRPr lang="en-US"/>
           </a:p>
@@ -3211,7 +3211,7 @@
           <a:p>
             <a:fld id="{42B10BCD-A866-B34B-B7E8-44C4BB9D2819}" type="datetimeFigureOut">
               <a:rPr lang="en-US" smtClean="0"/>
-              <a:t>6/2/25</a:t>
+              <a:t>6/5/25</a:t>
             </a:fld>
             <a:endParaRPr lang="en-US"/>
           </a:p>
@@ -3424,7 +3424,7 @@
           <a:p>
             <a:fld id="{42B10BCD-A866-B34B-B7E8-44C4BB9D2819}" type="datetimeFigureOut">
               <a:rPr lang="en-US" smtClean="0"/>
-              <a:t>6/2/25</a:t>
+              <a:t>6/5/25</a:t>
             </a:fld>
             <a:endParaRPr lang="en-US"/>
           </a:p>
@@ -4388,8 +4388,8 @@
           </a:p>
         </p:txBody>
       </p:sp>
-      <mc:AlternateContent xmlns:mc="http://schemas.openxmlformats.org/markup-compatibility/2006">
-        <mc:Choice xmlns:a14="http://schemas.microsoft.com/office/drawing/2010/main" Requires="a14">
+      <mc:AlternateContent xmlns:mc="http://schemas.openxmlformats.org/markup-compatibility/2006" xmlns:a14="http://schemas.microsoft.com/office/drawing/2010/main">
+        <mc:Choice Requires="a14">
           <p:sp>
             <p:nvSpPr>
               <p:cNvPr id="20" name="TextBox 19">
@@ -4472,7 +4472,7 @@
             </p:txBody>
           </p:sp>
         </mc:Choice>
-        <mc:Fallback>
+        <mc:Fallback xmlns="">
           <p:sp>
             <p:nvSpPr>
               <p:cNvPr id="20" name="TextBox 19">
@@ -4517,8 +4517,8 @@
           </p:sp>
         </mc:Fallback>
       </mc:AlternateContent>
-      <mc:AlternateContent xmlns:mc="http://schemas.openxmlformats.org/markup-compatibility/2006">
-        <mc:Choice xmlns:a14="http://schemas.microsoft.com/office/drawing/2010/main" Requires="a14">
+      <mc:AlternateContent xmlns:mc="http://schemas.openxmlformats.org/markup-compatibility/2006" xmlns:a14="http://schemas.microsoft.com/office/drawing/2010/main">
+        <mc:Choice Requires="a14">
           <p:sp>
             <p:nvSpPr>
               <p:cNvPr id="21" name="TextBox 20">
@@ -4621,7 +4621,7 @@
             </p:txBody>
           </p:sp>
         </mc:Choice>
-        <mc:Fallback>
+        <mc:Fallback xmlns="">
           <p:sp>
             <p:nvSpPr>
               <p:cNvPr id="21" name="TextBox 20">

</xml_diff>

<commit_message>
rescaled mass comparison to z=0
</commit_message>
<xml_diff>
--- a/Astro_Origin_table_horiz.pptx
+++ b/Astro_Origin_table_horiz.pptx
@@ -197,7 +197,7 @@
           <a:p>
             <a:fld id="{56190867-FD12-ED4C-AD02-12B91CD72869}" type="datetimeFigureOut">
               <a:rPr lang="en-US" smtClean="0"/>
-              <a:t>6/6/25</a:t>
+              <a:t>6/16/25</a:t>
             </a:fld>
             <a:endParaRPr lang="en-US"/>
           </a:p>
@@ -1038,7 +1038,7 @@
           <a:p>
             <a:fld id="{42B10BCD-A866-B34B-B7E8-44C4BB9D2819}" type="datetimeFigureOut">
               <a:rPr lang="en-US" smtClean="0"/>
-              <a:t>6/6/25</a:t>
+              <a:t>6/16/25</a:t>
             </a:fld>
             <a:endParaRPr lang="en-US"/>
           </a:p>
@@ -1208,7 +1208,7 @@
           <a:p>
             <a:fld id="{42B10BCD-A866-B34B-B7E8-44C4BB9D2819}" type="datetimeFigureOut">
               <a:rPr lang="en-US" smtClean="0"/>
-              <a:t>6/6/25</a:t>
+              <a:t>6/16/25</a:t>
             </a:fld>
             <a:endParaRPr lang="en-US"/>
           </a:p>
@@ -1388,7 +1388,7 @@
           <a:p>
             <a:fld id="{42B10BCD-A866-B34B-B7E8-44C4BB9D2819}" type="datetimeFigureOut">
               <a:rPr lang="en-US" smtClean="0"/>
-              <a:t>6/6/25</a:t>
+              <a:t>6/16/25</a:t>
             </a:fld>
             <a:endParaRPr lang="en-US"/>
           </a:p>
@@ -1619,7 +1619,7 @@
           <a:p>
             <a:fld id="{42B10BCD-A866-B34B-B7E8-44C4BB9D2819}" type="datetimeFigureOut">
               <a:rPr lang="en-US" smtClean="0"/>
-              <a:t>6/6/25</a:t>
+              <a:t>6/16/25</a:t>
             </a:fld>
             <a:endParaRPr lang="en-US"/>
           </a:p>
@@ -1865,7 +1865,7 @@
           <a:p>
             <a:fld id="{42B10BCD-A866-B34B-B7E8-44C4BB9D2819}" type="datetimeFigureOut">
               <a:rPr lang="en-US" smtClean="0"/>
-              <a:t>6/6/25</a:t>
+              <a:t>6/16/25</a:t>
             </a:fld>
             <a:endParaRPr lang="en-US"/>
           </a:p>
@@ -2097,7 +2097,7 @@
           <a:p>
             <a:fld id="{42B10BCD-A866-B34B-B7E8-44C4BB9D2819}" type="datetimeFigureOut">
               <a:rPr lang="en-US" smtClean="0"/>
-              <a:t>6/6/25</a:t>
+              <a:t>6/16/25</a:t>
             </a:fld>
             <a:endParaRPr lang="en-US"/>
           </a:p>
@@ -2464,7 +2464,7 @@
           <a:p>
             <a:fld id="{42B10BCD-A866-B34B-B7E8-44C4BB9D2819}" type="datetimeFigureOut">
               <a:rPr lang="en-US" smtClean="0"/>
-              <a:t>6/6/25</a:t>
+              <a:t>6/16/25</a:t>
             </a:fld>
             <a:endParaRPr lang="en-US"/>
           </a:p>
@@ -2582,7 +2582,7 @@
           <a:p>
             <a:fld id="{42B10BCD-A866-B34B-B7E8-44C4BB9D2819}" type="datetimeFigureOut">
               <a:rPr lang="en-US" smtClean="0"/>
-              <a:t>6/6/25</a:t>
+              <a:t>6/16/25</a:t>
             </a:fld>
             <a:endParaRPr lang="en-US"/>
           </a:p>
@@ -2677,7 +2677,7 @@
           <a:p>
             <a:fld id="{42B10BCD-A866-B34B-B7E8-44C4BB9D2819}" type="datetimeFigureOut">
               <a:rPr lang="en-US" smtClean="0"/>
-              <a:t>6/6/25</a:t>
+              <a:t>6/16/25</a:t>
             </a:fld>
             <a:endParaRPr lang="en-US"/>
           </a:p>
@@ -2954,7 +2954,7 @@
           <a:p>
             <a:fld id="{42B10BCD-A866-B34B-B7E8-44C4BB9D2819}" type="datetimeFigureOut">
               <a:rPr lang="en-US" smtClean="0"/>
-              <a:t>6/6/25</a:t>
+              <a:t>6/16/25</a:t>
             </a:fld>
             <a:endParaRPr lang="en-US"/>
           </a:p>
@@ -3211,7 +3211,7 @@
           <a:p>
             <a:fld id="{42B10BCD-A866-B34B-B7E8-44C4BB9D2819}" type="datetimeFigureOut">
               <a:rPr lang="en-US" smtClean="0"/>
-              <a:t>6/6/25</a:t>
+              <a:t>6/16/25</a:t>
             </a:fld>
             <a:endParaRPr lang="en-US"/>
           </a:p>
@@ -3424,7 +3424,7 @@
           <a:p>
             <a:fld id="{42B10BCD-A866-B34B-B7E8-44C4BB9D2819}" type="datetimeFigureOut">
               <a:rPr lang="en-US" smtClean="0"/>
-              <a:t>6/6/25</a:t>
+              <a:t>6/16/25</a:t>
             </a:fld>
             <a:endParaRPr lang="en-US"/>
           </a:p>
@@ -4502,8 +4502,8 @@
           </a:p>
         </p:txBody>
       </p:sp>
-      <mc:AlternateContent xmlns:mc="http://schemas.openxmlformats.org/markup-compatibility/2006">
-        <mc:Choice xmlns:a14="http://schemas.microsoft.com/office/drawing/2010/main" Requires="a14">
+      <mc:AlternateContent xmlns:mc="http://schemas.openxmlformats.org/markup-compatibility/2006" xmlns:a14="http://schemas.microsoft.com/office/drawing/2010/main">
+        <mc:Choice Requires="a14">
           <p:sp>
             <p:nvSpPr>
               <p:cNvPr id="20" name="TextBox 19">
@@ -4586,7 +4586,7 @@
             </p:txBody>
           </p:sp>
         </mc:Choice>
-        <mc:Fallback>
+        <mc:Fallback xmlns="">
           <p:sp>
             <p:nvSpPr>
               <p:cNvPr id="20" name="TextBox 19">
@@ -4631,8 +4631,8 @@
           </p:sp>
         </mc:Fallback>
       </mc:AlternateContent>
-      <mc:AlternateContent xmlns:mc="http://schemas.openxmlformats.org/markup-compatibility/2006">
-        <mc:Choice xmlns:a14="http://schemas.microsoft.com/office/drawing/2010/main" Requires="a14">
+      <mc:AlternateContent xmlns:mc="http://schemas.openxmlformats.org/markup-compatibility/2006" xmlns:a14="http://schemas.microsoft.com/office/drawing/2010/main">
+        <mc:Choice Requires="a14">
           <p:sp>
             <p:nvSpPr>
               <p:cNvPr id="21" name="TextBox 20">
@@ -4735,7 +4735,7 @@
             </p:txBody>
           </p:sp>
         </mc:Choice>
-        <mc:Fallback>
+        <mc:Fallback xmlns="">
           <p:sp>
             <p:nvSpPr>
               <p:cNvPr id="21" name="TextBox 20">
@@ -12319,7 +12319,7 @@
         <p:spPr>
           <a:xfrm>
             <a:off x="1304788" y="5285393"/>
-            <a:ext cx="1303562" cy="338554"/>
+            <a:ext cx="1052276" cy="338554"/>
           </a:xfrm>
           <a:prstGeom prst="rect">
             <a:avLst/>
@@ -12334,7 +12334,7 @@
           <a:p>
             <a:r>
               <a:rPr lang="en-US" sz="1600" dirty="0"/>
-              <a:t>Not possible</a:t>
+              <a:t>No match</a:t>
             </a:r>
           </a:p>
         </p:txBody>

</xml_diff>

<commit_message>
trying to resolve diverging branch
</commit_message>
<xml_diff>
--- a/Astro_Origin_table_horiz.pptx
+++ b/Astro_Origin_table_horiz.pptx
@@ -197,7 +197,7 @@
           <a:p>
             <a:fld id="{56190867-FD12-ED4C-AD02-12B91CD72869}" type="datetimeFigureOut">
               <a:rPr lang="en-US" smtClean="0"/>
-              <a:t>6/16/25</a:t>
+              <a:t>6/17/25</a:t>
             </a:fld>
             <a:endParaRPr lang="en-US"/>
           </a:p>
@@ -1038,7 +1038,7 @@
           <a:p>
             <a:fld id="{42B10BCD-A866-B34B-B7E8-44C4BB9D2819}" type="datetimeFigureOut">
               <a:rPr lang="en-US" smtClean="0"/>
-              <a:t>6/16/25</a:t>
+              <a:t>6/17/25</a:t>
             </a:fld>
             <a:endParaRPr lang="en-US"/>
           </a:p>
@@ -1208,7 +1208,7 @@
           <a:p>
             <a:fld id="{42B10BCD-A866-B34B-B7E8-44C4BB9D2819}" type="datetimeFigureOut">
               <a:rPr lang="en-US" smtClean="0"/>
-              <a:t>6/16/25</a:t>
+              <a:t>6/17/25</a:t>
             </a:fld>
             <a:endParaRPr lang="en-US"/>
           </a:p>
@@ -1388,7 +1388,7 @@
           <a:p>
             <a:fld id="{42B10BCD-A866-B34B-B7E8-44C4BB9D2819}" type="datetimeFigureOut">
               <a:rPr lang="en-US" smtClean="0"/>
-              <a:t>6/16/25</a:t>
+              <a:t>6/17/25</a:t>
             </a:fld>
             <a:endParaRPr lang="en-US"/>
           </a:p>
@@ -1619,7 +1619,7 @@
           <a:p>
             <a:fld id="{42B10BCD-A866-B34B-B7E8-44C4BB9D2819}" type="datetimeFigureOut">
               <a:rPr lang="en-US" smtClean="0"/>
-              <a:t>6/16/25</a:t>
+              <a:t>6/17/25</a:t>
             </a:fld>
             <a:endParaRPr lang="en-US"/>
           </a:p>
@@ -1865,7 +1865,7 @@
           <a:p>
             <a:fld id="{42B10BCD-A866-B34B-B7E8-44C4BB9D2819}" type="datetimeFigureOut">
               <a:rPr lang="en-US" smtClean="0"/>
-              <a:t>6/16/25</a:t>
+              <a:t>6/17/25</a:t>
             </a:fld>
             <a:endParaRPr lang="en-US"/>
           </a:p>
@@ -2097,7 +2097,7 @@
           <a:p>
             <a:fld id="{42B10BCD-A866-B34B-B7E8-44C4BB9D2819}" type="datetimeFigureOut">
               <a:rPr lang="en-US" smtClean="0"/>
-              <a:t>6/16/25</a:t>
+              <a:t>6/17/25</a:t>
             </a:fld>
             <a:endParaRPr lang="en-US"/>
           </a:p>
@@ -2464,7 +2464,7 @@
           <a:p>
             <a:fld id="{42B10BCD-A866-B34B-B7E8-44C4BB9D2819}" type="datetimeFigureOut">
               <a:rPr lang="en-US" smtClean="0"/>
-              <a:t>6/16/25</a:t>
+              <a:t>6/17/25</a:t>
             </a:fld>
             <a:endParaRPr lang="en-US"/>
           </a:p>
@@ -2582,7 +2582,7 @@
           <a:p>
             <a:fld id="{42B10BCD-A866-B34B-B7E8-44C4BB9D2819}" type="datetimeFigureOut">
               <a:rPr lang="en-US" smtClean="0"/>
-              <a:t>6/16/25</a:t>
+              <a:t>6/17/25</a:t>
             </a:fld>
             <a:endParaRPr lang="en-US"/>
           </a:p>
@@ -2677,7 +2677,7 @@
           <a:p>
             <a:fld id="{42B10BCD-A866-B34B-B7E8-44C4BB9D2819}" type="datetimeFigureOut">
               <a:rPr lang="en-US" smtClean="0"/>
-              <a:t>6/16/25</a:t>
+              <a:t>6/17/25</a:t>
             </a:fld>
             <a:endParaRPr lang="en-US"/>
           </a:p>
@@ -2954,7 +2954,7 @@
           <a:p>
             <a:fld id="{42B10BCD-A866-B34B-B7E8-44C4BB9D2819}" type="datetimeFigureOut">
               <a:rPr lang="en-US" smtClean="0"/>
-              <a:t>6/16/25</a:t>
+              <a:t>6/17/25</a:t>
             </a:fld>
             <a:endParaRPr lang="en-US"/>
           </a:p>
@@ -3211,7 +3211,7 @@
           <a:p>
             <a:fld id="{42B10BCD-A866-B34B-B7E8-44C4BB9D2819}" type="datetimeFigureOut">
               <a:rPr lang="en-US" smtClean="0"/>
-              <a:t>6/16/25</a:t>
+              <a:t>6/17/25</a:t>
             </a:fld>
             <a:endParaRPr lang="en-US"/>
           </a:p>
@@ -3424,7 +3424,7 @@
           <a:p>
             <a:fld id="{42B10BCD-A866-B34B-B7E8-44C4BB9D2819}" type="datetimeFigureOut">
               <a:rPr lang="en-US" smtClean="0"/>
-              <a:t>6/16/25</a:t>
+              <a:t>6/17/25</a:t>
             </a:fld>
             <a:endParaRPr lang="en-US"/>
           </a:p>
@@ -3867,60 +3867,6 @@
           <a:solidFill>
             <a:srgbClr val="CA2243">
               <a:alpha val="25000"/>
-            </a:srgbClr>
-          </a:solidFill>
-          <a:ln>
-            <a:noFill/>
-          </a:ln>
-        </p:spPr>
-        <p:style>
-          <a:lnRef idx="2">
-            <a:schemeClr val="accent1">
-              <a:shade val="15000"/>
-            </a:schemeClr>
-          </a:lnRef>
-          <a:fillRef idx="1">
-            <a:schemeClr val="accent1"/>
-          </a:fillRef>
-          <a:effectRef idx="0">
-            <a:schemeClr val="accent1"/>
-          </a:effectRef>
-          <a:fontRef idx="minor">
-            <a:schemeClr val="lt1"/>
-          </a:fontRef>
-        </p:style>
-        <p:txBody>
-          <a:bodyPr rtlCol="0" anchor="ctr"/>
-          <a:lstStyle/>
-          <a:p>
-            <a:pPr algn="ctr"/>
-            <a:endParaRPr lang="en-US"/>
-          </a:p>
-        </p:txBody>
-      </p:sp>
-      <p:sp>
-        <p:nvSpPr>
-          <p:cNvPr id="148" name="Rectangle 147">
-            <a:extLst>
-              <a:ext uri="{FF2B5EF4-FFF2-40B4-BE49-F238E27FC236}">
-                <a16:creationId xmlns:a16="http://schemas.microsoft.com/office/drawing/2014/main" id="{E2E94001-36DC-3DE7-9A2B-477059922652}"/>
-              </a:ext>
-            </a:extLst>
-          </p:cNvPr>
-          <p:cNvSpPr/>
-          <p:nvPr/>
-        </p:nvSpPr>
-        <p:spPr>
-          <a:xfrm>
-            <a:off x="2059373" y="3018532"/>
-            <a:ext cx="6221027" cy="521078"/>
-          </a:xfrm>
-          <a:prstGeom prst="rect">
-            <a:avLst/>
-          </a:prstGeom>
-          <a:solidFill>
-            <a:srgbClr val="CA2243">
-              <a:alpha val="5000"/>
             </a:srgbClr>
           </a:solidFill>
           <a:ln>
@@ -10937,7 +10883,7 @@
         </p:nvSpPr>
         <p:spPr>
           <a:xfrm>
-            <a:off x="4469164" y="5254615"/>
+            <a:off x="2966550" y="5251982"/>
             <a:ext cx="256481" cy="369332"/>
           </a:xfrm>
           <a:prstGeom prst="rect">
@@ -10976,7 +10922,7 @@
         </p:nvSpPr>
         <p:spPr>
           <a:xfrm>
-            <a:off x="2862907" y="5254615"/>
+            <a:off x="4760856" y="5251982"/>
             <a:ext cx="314934" cy="369332"/>
           </a:xfrm>
           <a:prstGeom prst="rect">
@@ -11020,7 +10966,7 @@
         </p:nvSpPr>
         <p:spPr>
           <a:xfrm>
-            <a:off x="1044360" y="5254615"/>
+            <a:off x="6608679" y="5251982"/>
             <a:ext cx="245006" cy="369332"/>
           </a:xfrm>
           <a:prstGeom prst="rect">
@@ -11070,7 +11016,7 @@
         </p:nvSpPr>
         <p:spPr>
           <a:xfrm>
-            <a:off x="6038751" y="5254615"/>
+            <a:off x="1437957" y="5251982"/>
             <a:ext cx="256481" cy="369332"/>
           </a:xfrm>
           <a:prstGeom prst="rect">
@@ -12317,7 +12263,7 @@
         </p:nvSpPr>
         <p:spPr>
           <a:xfrm>
-            <a:off x="1304788" y="5285393"/>
+            <a:off x="6914158" y="5282760"/>
             <a:ext cx="1052276" cy="338554"/>
           </a:xfrm>
           <a:prstGeom prst="rect">
@@ -12352,7 +12298,7 @@
         </p:nvSpPr>
         <p:spPr>
           <a:xfrm>
-            <a:off x="3177841" y="5285393"/>
+            <a:off x="5128641" y="5282760"/>
             <a:ext cx="1000467" cy="338554"/>
           </a:xfrm>
           <a:prstGeom prst="rect">
@@ -12387,7 +12333,7 @@
         </p:nvSpPr>
         <p:spPr>
           <a:xfrm>
-            <a:off x="4794200" y="5285393"/>
+            <a:off x="3275882" y="5282760"/>
             <a:ext cx="1005403" cy="338554"/>
           </a:xfrm>
           <a:prstGeom prst="rect">
@@ -12422,7 +12368,7 @@
         </p:nvSpPr>
         <p:spPr>
           <a:xfrm>
-            <a:off x="6288718" y="5285393"/>
+            <a:off x="1754909" y="5282760"/>
             <a:ext cx="739690" cy="338554"/>
           </a:xfrm>
           <a:prstGeom prst="rect">
@@ -13136,9 +13082,6 @@
             <a:pPr algn="ctr"/>
             <a:r>
               <a:rPr lang="en-US" sz="2400" dirty="0">
-                <a:solidFill>
-                  <a:srgbClr val="CA2243"/>
-                </a:solidFill>
                 <a:latin typeface="Arial" panose="020B0604020202020204" pitchFamily="34" charset="0"/>
                 <a:ea typeface="Latin Modern Math" panose="02000503000000000000" pitchFamily="2" charset="77"/>
                 <a:cs typeface="Arial" panose="020B0604020202020204" pitchFamily="34" charset="0"/>
@@ -13146,9 +13089,6 @@
               <a:t>X</a:t>
             </a:r>
             <a:endParaRPr lang="en-US" sz="2400" dirty="0">
-              <a:solidFill>
-                <a:srgbClr val="CA2243"/>
-              </a:solidFill>
               <a:latin typeface="Arial" panose="020B0604020202020204" pitchFamily="34" charset="0"/>
               <a:cs typeface="Arial" panose="020B0604020202020204" pitchFamily="34" charset="0"/>
             </a:endParaRPr>

</xml_diff>